<commit_message>
tidy up repository and prefix notebooks with numbers
</commit_message>
<xml_diff>
--- a/Tidy_up/03_Presentation.pptx
+++ b/Tidy_up/03_Presentation.pptx
@@ -12,6 +12,7 @@
     <p:sldId id="265" r:id="rId6"/>
     <p:sldId id="277" r:id="rId7"/>
     <p:sldId id="278" r:id="rId8"/>
+    <p:sldId id="280" r:id="rId9"/>
   </p:sldIdLst>
   <p:sldSz cx="12192000" cy="6858000"/>
   <p:notesSz cx="6858000" cy="9144000"/>
@@ -126,6 +127,90 @@
 </p1510:revInfo>
 </file>
 
+<file path=ppt/changesInfos/changesInfo1.xml><?xml version="1.0" encoding="utf-8"?>
+<pc:chgInfo xmlns:a="http://schemas.openxmlformats.org/drawingml/2006/main" xmlns:r="http://schemas.openxmlformats.org/officeDocument/2006/relationships" xmlns:ac="http://schemas.microsoft.com/office/drawing/2013/main/command" xmlns:pc="http://schemas.microsoft.com/office/powerpoint/2013/main/command">
+  <pc:docChgLst>
+    <pc:chgData name="Gary Whitney" userId="c5a75123e981c5c3" providerId="LiveId" clId="{F217014B-EAAD-45A9-9A2C-EC76D7AEDF22}"/>
+    <pc:docChg chg="custSel addSld modSld">
+      <pc:chgData name="Gary Whitney" userId="c5a75123e981c5c3" providerId="LiveId" clId="{F217014B-EAAD-45A9-9A2C-EC76D7AEDF22}" dt="2021-08-14T06:25:19.923" v="59" actId="14100"/>
+      <pc:docMkLst>
+        <pc:docMk/>
+      </pc:docMkLst>
+      <pc:sldChg chg="addSp delSp modSp mod">
+        <pc:chgData name="Gary Whitney" userId="c5a75123e981c5c3" providerId="LiveId" clId="{F217014B-EAAD-45A9-9A2C-EC76D7AEDF22}" dt="2021-08-14T06:21:51.297" v="43" actId="14100"/>
+        <pc:sldMkLst>
+          <pc:docMk/>
+          <pc:sldMk cId="227139849" sldId="278"/>
+        </pc:sldMkLst>
+        <pc:picChg chg="del">
+          <ac:chgData name="Gary Whitney" userId="c5a75123e981c5c3" providerId="LiveId" clId="{F217014B-EAAD-45A9-9A2C-EC76D7AEDF22}" dt="2021-08-14T06:21:14.721" v="36" actId="478"/>
+          <ac:picMkLst>
+            <pc:docMk/>
+            <pc:sldMk cId="227139849" sldId="278"/>
+            <ac:picMk id="2" creationId="{BDEB5664-3C67-4E4F-8544-FCA47DFC4882}"/>
+          </ac:picMkLst>
+        </pc:picChg>
+        <pc:picChg chg="add mod">
+          <ac:chgData name="Gary Whitney" userId="c5a75123e981c5c3" providerId="LiveId" clId="{F217014B-EAAD-45A9-9A2C-EC76D7AEDF22}" dt="2021-08-14T06:21:51.297" v="43" actId="14100"/>
+          <ac:picMkLst>
+            <pc:docMk/>
+            <pc:sldMk cId="227139849" sldId="278"/>
+            <ac:picMk id="6" creationId="{1EBBF1F7-0E62-4220-8614-1506EFFAFFDC}"/>
+          </ac:picMkLst>
+        </pc:picChg>
+      </pc:sldChg>
+      <pc:sldChg chg="addSp delSp modSp add mod">
+        <pc:chgData name="Gary Whitney" userId="c5a75123e981c5c3" providerId="LiveId" clId="{F217014B-EAAD-45A9-9A2C-EC76D7AEDF22}" dt="2021-08-14T06:25:19.923" v="59" actId="14100"/>
+        <pc:sldMkLst>
+          <pc:docMk/>
+          <pc:sldMk cId="4016988560" sldId="280"/>
+        </pc:sldMkLst>
+        <pc:spChg chg="mod">
+          <ac:chgData name="Gary Whitney" userId="c5a75123e981c5c3" providerId="LiveId" clId="{F217014B-EAAD-45A9-9A2C-EC76D7AEDF22}" dt="2021-08-14T06:20:36.342" v="35" actId="20577"/>
+          <ac:spMkLst>
+            <pc:docMk/>
+            <pc:sldMk cId="4016988560" sldId="280"/>
+            <ac:spMk id="5" creationId="{DB08F3D1-067E-408B-88CE-6053EC917A41}"/>
+          </ac:spMkLst>
+        </pc:spChg>
+        <pc:picChg chg="del">
+          <ac:chgData name="Gary Whitney" userId="c5a75123e981c5c3" providerId="LiveId" clId="{F217014B-EAAD-45A9-9A2C-EC76D7AEDF22}" dt="2021-08-14T06:24:14.872" v="44" actId="478"/>
+          <ac:picMkLst>
+            <pc:docMk/>
+            <pc:sldMk cId="4016988560" sldId="280"/>
+            <ac:picMk id="2" creationId="{BDEB5664-3C67-4E4F-8544-FCA47DFC4882}"/>
+          </ac:picMkLst>
+        </pc:picChg>
+        <pc:picChg chg="del">
+          <ac:chgData name="Gary Whitney" userId="c5a75123e981c5c3" providerId="LiveId" clId="{F217014B-EAAD-45A9-9A2C-EC76D7AEDF22}" dt="2021-08-14T06:24:16.815" v="45" actId="478"/>
+          <ac:picMkLst>
+            <pc:docMk/>
+            <pc:sldMk cId="4016988560" sldId="280"/>
+            <ac:picMk id="4" creationId="{F8ADE2F3-4109-488F-9F91-258C30FA81C4}"/>
+          </ac:picMkLst>
+        </pc:picChg>
+        <pc:picChg chg="add mod">
+          <ac:chgData name="Gary Whitney" userId="c5a75123e981c5c3" providerId="LiveId" clId="{F217014B-EAAD-45A9-9A2C-EC76D7AEDF22}" dt="2021-08-14T06:25:19.923" v="59" actId="14100"/>
+          <ac:picMkLst>
+            <pc:docMk/>
+            <pc:sldMk cId="4016988560" sldId="280"/>
+            <ac:picMk id="6" creationId="{B37B6891-75C1-48AB-AA24-543E312F987A}"/>
+          </ac:picMkLst>
+        </pc:picChg>
+        <pc:picChg chg="add mod">
+          <ac:chgData name="Gary Whitney" userId="c5a75123e981c5c3" providerId="LiveId" clId="{F217014B-EAAD-45A9-9A2C-EC76D7AEDF22}" dt="2021-08-14T06:25:01.868" v="58" actId="1076"/>
+          <ac:picMkLst>
+            <pc:docMk/>
+            <pc:sldMk cId="4016988560" sldId="280"/>
+            <ac:picMk id="8" creationId="{BDF2A16F-4990-4163-91B7-7760E7A61262}"/>
+          </ac:picMkLst>
+        </pc:picChg>
+      </pc:sldChg>
+    </pc:docChg>
+  </pc:docChgLst>
+</pc:chgInfo>
+</file>
+
 <file path=ppt/slideLayouts/slideLayout1.xml><?xml version="1.0" encoding="utf-8"?>
 <p:sldLayout xmlns:a="http://schemas.openxmlformats.org/drawingml/2006/main" xmlns:r="http://schemas.openxmlformats.org/officeDocument/2006/relationships" xmlns:p="http://schemas.openxmlformats.org/presentationml/2006/main" type="title" preserve="1">
   <p:cSld name="Title Slide">
@@ -275,7 +360,7 @@
           <a:p>
             <a:fld id="{68487541-4641-49BC-B265-F6B25A6B276F}" type="datetimeFigureOut">
               <a:rPr lang="en-GB" smtClean="0"/>
-              <a:t>13/08/2021</a:t>
+              <a:t>14/08/2021</a:t>
             </a:fld>
             <a:endParaRPr lang="en-GB"/>
           </a:p>
@@ -475,7 +560,7 @@
           <a:p>
             <a:fld id="{68487541-4641-49BC-B265-F6B25A6B276F}" type="datetimeFigureOut">
               <a:rPr lang="en-GB" smtClean="0"/>
-              <a:t>13/08/2021</a:t>
+              <a:t>14/08/2021</a:t>
             </a:fld>
             <a:endParaRPr lang="en-GB"/>
           </a:p>
@@ -685,7 +770,7 @@
           <a:p>
             <a:fld id="{68487541-4641-49BC-B265-F6B25A6B276F}" type="datetimeFigureOut">
               <a:rPr lang="en-GB" smtClean="0"/>
-              <a:t>13/08/2021</a:t>
+              <a:t>14/08/2021</a:t>
             </a:fld>
             <a:endParaRPr lang="en-GB"/>
           </a:p>
@@ -885,7 +970,7 @@
           <a:p>
             <a:fld id="{68487541-4641-49BC-B265-F6B25A6B276F}" type="datetimeFigureOut">
               <a:rPr lang="en-GB" smtClean="0"/>
-              <a:t>13/08/2021</a:t>
+              <a:t>14/08/2021</a:t>
             </a:fld>
             <a:endParaRPr lang="en-GB"/>
           </a:p>
@@ -1161,7 +1246,7 @@
           <a:p>
             <a:fld id="{68487541-4641-49BC-B265-F6B25A6B276F}" type="datetimeFigureOut">
               <a:rPr lang="en-GB" smtClean="0"/>
-              <a:t>13/08/2021</a:t>
+              <a:t>14/08/2021</a:t>
             </a:fld>
             <a:endParaRPr lang="en-GB"/>
           </a:p>
@@ -1429,7 +1514,7 @@
           <a:p>
             <a:fld id="{68487541-4641-49BC-B265-F6B25A6B276F}" type="datetimeFigureOut">
               <a:rPr lang="en-GB" smtClean="0"/>
-              <a:t>13/08/2021</a:t>
+              <a:t>14/08/2021</a:t>
             </a:fld>
             <a:endParaRPr lang="en-GB"/>
           </a:p>
@@ -1844,7 +1929,7 @@
           <a:p>
             <a:fld id="{68487541-4641-49BC-B265-F6B25A6B276F}" type="datetimeFigureOut">
               <a:rPr lang="en-GB" smtClean="0"/>
-              <a:t>13/08/2021</a:t>
+              <a:t>14/08/2021</a:t>
             </a:fld>
             <a:endParaRPr lang="en-GB"/>
           </a:p>
@@ -1986,7 +2071,7 @@
           <a:p>
             <a:fld id="{68487541-4641-49BC-B265-F6B25A6B276F}" type="datetimeFigureOut">
               <a:rPr lang="en-GB" smtClean="0"/>
-              <a:t>13/08/2021</a:t>
+              <a:t>14/08/2021</a:t>
             </a:fld>
             <a:endParaRPr lang="en-GB"/>
           </a:p>
@@ -2099,7 +2184,7 @@
           <a:p>
             <a:fld id="{68487541-4641-49BC-B265-F6B25A6B276F}" type="datetimeFigureOut">
               <a:rPr lang="en-GB" smtClean="0"/>
-              <a:t>13/08/2021</a:t>
+              <a:t>14/08/2021</a:t>
             </a:fld>
             <a:endParaRPr lang="en-GB"/>
           </a:p>
@@ -2412,7 +2497,7 @@
           <a:p>
             <a:fld id="{68487541-4641-49BC-B265-F6B25A6B276F}" type="datetimeFigureOut">
               <a:rPr lang="en-GB" smtClean="0"/>
-              <a:t>13/08/2021</a:t>
+              <a:t>14/08/2021</a:t>
             </a:fld>
             <a:endParaRPr lang="en-GB"/>
           </a:p>
@@ -2701,7 +2786,7 @@
           <a:p>
             <a:fld id="{68487541-4641-49BC-B265-F6B25A6B276F}" type="datetimeFigureOut">
               <a:rPr lang="en-GB" smtClean="0"/>
-              <a:t>13/08/2021</a:t>
+              <a:t>14/08/2021</a:t>
             </a:fld>
             <a:endParaRPr lang="en-GB"/>
           </a:p>
@@ -2944,7 +3029,7 @@
           <a:p>
             <a:fld id="{68487541-4641-49BC-B265-F6B25A6B276F}" type="datetimeFigureOut">
               <a:rPr lang="en-GB" smtClean="0"/>
-              <a:t>13/08/2021</a:t>
+              <a:t>14/08/2021</a:t>
             </a:fld>
             <a:endParaRPr lang="en-GB"/>
           </a:p>
@@ -4380,10 +4465,10 @@
       </p:grpSpPr>
       <p:pic>
         <p:nvPicPr>
-          <p:cNvPr id="2" name="Picture 1" descr="Chart, bar chart&#10;&#10;Description automatically generated">
-            <a:extLst>
-              <a:ext uri="{FF2B5EF4-FFF2-40B4-BE49-F238E27FC236}">
-                <a16:creationId xmlns:a16="http://schemas.microsoft.com/office/drawing/2014/main" id="{BDEB5664-3C67-4E4F-8544-FCA47DFC4882}"/>
+          <p:cNvPr id="4" name="Picture 3">
+            <a:extLst>
+              <a:ext uri="{FF2B5EF4-FFF2-40B4-BE49-F238E27FC236}">
+                <a16:creationId xmlns:a16="http://schemas.microsoft.com/office/drawing/2014/main" id="{F8ADE2F3-4109-488F-9F91-258C30FA81C4}"/>
               </a:ext>
             </a:extLst>
           </p:cNvPr>
@@ -4394,42 +4479,6 @@
         </p:nvPicPr>
         <p:blipFill>
           <a:blip r:embed="rId2">
-            <a:extLst>
-              <a:ext uri="{28A0092B-C50C-407E-A947-70E740481C1C}">
-                <a14:useLocalDpi xmlns:a14="http://schemas.microsoft.com/office/drawing/2010/main" val="0"/>
-              </a:ext>
-            </a:extLst>
-          </a:blip>
-          <a:stretch>
-            <a:fillRect/>
-          </a:stretch>
-        </p:blipFill>
-        <p:spPr>
-          <a:xfrm>
-            <a:off x="83117" y="1169295"/>
-            <a:ext cx="6869841" cy="5574145"/>
-          </a:xfrm>
-          <a:prstGeom prst="rect">
-            <a:avLst/>
-          </a:prstGeom>
-        </p:spPr>
-      </p:pic>
-      <p:pic>
-        <p:nvPicPr>
-          <p:cNvPr id="4" name="Picture 3">
-            <a:extLst>
-              <a:ext uri="{FF2B5EF4-FFF2-40B4-BE49-F238E27FC236}">
-                <a16:creationId xmlns:a16="http://schemas.microsoft.com/office/drawing/2014/main" id="{F8ADE2F3-4109-488F-9F91-258C30FA81C4}"/>
-              </a:ext>
-            </a:extLst>
-          </p:cNvPr>
-          <p:cNvPicPr>
-            <a:picLocks noChangeAspect="1"/>
-          </p:cNvPicPr>
-          <p:nvPr/>
-        </p:nvPicPr>
-        <p:blipFill>
-          <a:blip r:embed="rId3">
             <a:extLst>
               <a:ext uri="{28A0092B-C50C-407E-A947-70E740481C1C}">
                 <a14:useLocalDpi xmlns:a14="http://schemas.microsoft.com/office/drawing/2010/main" val="0"/>
@@ -4512,10 +4561,190 @@
           </a:p>
         </p:txBody>
       </p:sp>
+      <p:pic>
+        <p:nvPicPr>
+          <p:cNvPr id="6" name="Picture 5" descr="Chart&#10;&#10;Description automatically generated">
+            <a:extLst>
+              <a:ext uri="{FF2B5EF4-FFF2-40B4-BE49-F238E27FC236}">
+                <a16:creationId xmlns:a16="http://schemas.microsoft.com/office/drawing/2014/main" id="{1EBBF1F7-0E62-4220-8614-1506EFFAFFDC}"/>
+              </a:ext>
+            </a:extLst>
+          </p:cNvPr>
+          <p:cNvPicPr>
+            <a:picLocks noChangeAspect="1"/>
+          </p:cNvPicPr>
+          <p:nvPr/>
+        </p:nvPicPr>
+        <p:blipFill>
+          <a:blip r:embed="rId3">
+            <a:extLst>
+              <a:ext uri="{28A0092B-C50C-407E-A947-70E740481C1C}">
+                <a14:useLocalDpi xmlns:a14="http://schemas.microsoft.com/office/drawing/2010/main" val="0"/>
+              </a:ext>
+            </a:extLst>
+          </a:blip>
+          <a:stretch>
+            <a:fillRect/>
+          </a:stretch>
+        </p:blipFill>
+        <p:spPr>
+          <a:xfrm>
+            <a:off x="113018" y="1072793"/>
+            <a:ext cx="6839940" cy="5574145"/>
+          </a:xfrm>
+          <a:prstGeom prst="rect">
+            <a:avLst/>
+          </a:prstGeom>
+        </p:spPr>
+      </p:pic>
     </p:spTree>
     <p:extLst>
       <p:ext uri="{BB962C8B-B14F-4D97-AF65-F5344CB8AC3E}">
         <p14:creationId xmlns:p14="http://schemas.microsoft.com/office/powerpoint/2010/main" val="227139849"/>
+      </p:ext>
+    </p:extLst>
+  </p:cSld>
+  <p:clrMapOvr>
+    <a:masterClrMapping/>
+  </p:clrMapOvr>
+</p:sld>
+</file>
+
+<file path=ppt/slides/slide8.xml><?xml version="1.0" encoding="utf-8"?>
+<p:sld xmlns:a="http://schemas.openxmlformats.org/drawingml/2006/main" xmlns:r="http://schemas.openxmlformats.org/officeDocument/2006/relationships" xmlns:p="http://schemas.openxmlformats.org/presentationml/2006/main">
+  <p:cSld>
+    <p:spTree>
+      <p:nvGrpSpPr>
+        <p:cNvPr id="1" name=""/>
+        <p:cNvGrpSpPr/>
+        <p:nvPr/>
+      </p:nvGrpSpPr>
+      <p:grpSpPr>
+        <a:xfrm>
+          <a:off x="0" y="0"/>
+          <a:ext cx="0" cy="0"/>
+          <a:chOff x="0" y="0"/>
+          <a:chExt cx="0" cy="0"/>
+        </a:xfrm>
+      </p:grpSpPr>
+      <p:sp>
+        <p:nvSpPr>
+          <p:cNvPr id="5" name="TextBox 4">
+            <a:extLst>
+              <a:ext uri="{FF2B5EF4-FFF2-40B4-BE49-F238E27FC236}">
+                <a16:creationId xmlns:a16="http://schemas.microsoft.com/office/drawing/2014/main" id="{DB08F3D1-067E-408B-88CE-6053EC917A41}"/>
+              </a:ext>
+            </a:extLst>
+          </p:cNvPr>
+          <p:cNvSpPr txBox="1"/>
+          <p:nvPr/>
+        </p:nvSpPr>
+        <p:spPr>
+          <a:xfrm>
+            <a:off x="412376" y="380110"/>
+            <a:ext cx="6096000" cy="369332"/>
+          </a:xfrm>
+          <a:prstGeom prst="rect">
+            <a:avLst/>
+          </a:prstGeom>
+          <a:noFill/>
+        </p:spPr>
+        <p:txBody>
+          <a:bodyPr wrap="square">
+            <a:spAutoFit/>
+          </a:bodyPr>
+          <a:lstStyle/>
+          <a:p>
+            <a:pPr algn="l"/>
+            <a:r>
+              <a:rPr lang="en-US" b="1" i="0" dirty="0">
+                <a:solidFill>
+                  <a:srgbClr val="24292E"/>
+                </a:solidFill>
+                <a:effectLst/>
+                <a:latin typeface="-apple-system"/>
+              </a:rPr>
+              <a:t>Or Is it the weather or road conditions?</a:t>
+            </a:r>
+          </a:p>
+        </p:txBody>
+      </p:sp>
+      <p:pic>
+        <p:nvPicPr>
+          <p:cNvPr id="6" name="Picture 5" descr="Chart&#10;&#10;Description automatically generated with low confidence">
+            <a:extLst>
+              <a:ext uri="{FF2B5EF4-FFF2-40B4-BE49-F238E27FC236}">
+                <a16:creationId xmlns:a16="http://schemas.microsoft.com/office/drawing/2014/main" id="{B37B6891-75C1-48AB-AA24-543E312F987A}"/>
+              </a:ext>
+            </a:extLst>
+          </p:cNvPr>
+          <p:cNvPicPr>
+            <a:picLocks noChangeAspect="1"/>
+          </p:cNvPicPr>
+          <p:nvPr/>
+        </p:nvPicPr>
+        <p:blipFill>
+          <a:blip r:embed="rId2">
+            <a:extLst>
+              <a:ext uri="{28A0092B-C50C-407E-A947-70E740481C1C}">
+                <a14:useLocalDpi xmlns:a14="http://schemas.microsoft.com/office/drawing/2010/main" val="0"/>
+              </a:ext>
+            </a:extLst>
+          </a:blip>
+          <a:stretch>
+            <a:fillRect/>
+          </a:stretch>
+        </p:blipFill>
+        <p:spPr>
+          <a:xfrm>
+            <a:off x="154063" y="849745"/>
+            <a:ext cx="5135479" cy="4886777"/>
+          </a:xfrm>
+          <a:prstGeom prst="rect">
+            <a:avLst/>
+          </a:prstGeom>
+        </p:spPr>
+      </p:pic>
+      <p:pic>
+        <p:nvPicPr>
+          <p:cNvPr id="8" name="Picture 7" descr="Chart, pie chart&#10;&#10;Description automatically generated">
+            <a:extLst>
+              <a:ext uri="{FF2B5EF4-FFF2-40B4-BE49-F238E27FC236}">
+                <a16:creationId xmlns:a16="http://schemas.microsoft.com/office/drawing/2014/main" id="{BDF2A16F-4990-4163-91B7-7760E7A61262}"/>
+              </a:ext>
+            </a:extLst>
+          </p:cNvPr>
+          <p:cNvPicPr>
+            <a:picLocks noChangeAspect="1"/>
+          </p:cNvPicPr>
+          <p:nvPr/>
+        </p:nvPicPr>
+        <p:blipFill>
+          <a:blip r:embed="rId3">
+            <a:extLst>
+              <a:ext uri="{28A0092B-C50C-407E-A947-70E740481C1C}">
+                <a14:useLocalDpi xmlns:a14="http://schemas.microsoft.com/office/drawing/2010/main" val="0"/>
+              </a:ext>
+            </a:extLst>
+          </a:blip>
+          <a:stretch>
+            <a:fillRect/>
+          </a:stretch>
+        </p:blipFill>
+        <p:spPr>
+          <a:xfrm>
+            <a:off x="6902460" y="749442"/>
+            <a:ext cx="6303288" cy="5028235"/>
+          </a:xfrm>
+          <a:prstGeom prst="rect">
+            <a:avLst/>
+          </a:prstGeom>
+        </p:spPr>
+      </p:pic>
+    </p:spTree>
+    <p:extLst>
+      <p:ext uri="{BB962C8B-B14F-4D97-AF65-F5344CB8AC3E}">
+        <p14:creationId xmlns:p14="http://schemas.microsoft.com/office/powerpoint/2010/main" val="4016988560"/>
       </p:ext>
     </p:extLst>
   </p:cSld>

</xml_diff>

<commit_message>
update presenation to include Hypothesis and create pdf
</commit_message>
<xml_diff>
--- a/Tidy_up/03_Presentation.pptx
+++ b/Tidy_up/03_Presentation.pptx
@@ -132,16 +132,140 @@
   <pc:docChgLst>
     <pc:chgData name="Gary Whitney" userId="c5a75123e981c5c3" providerId="LiveId" clId="{F217014B-EAAD-45A9-9A2C-EC76D7AEDF22}"/>
     <pc:docChg chg="custSel addSld modSld">
-      <pc:chgData name="Gary Whitney" userId="c5a75123e981c5c3" providerId="LiveId" clId="{F217014B-EAAD-45A9-9A2C-EC76D7AEDF22}" dt="2021-08-14T06:25:19.923" v="59" actId="14100"/>
+      <pc:chgData name="Gary Whitney" userId="c5a75123e981c5c3" providerId="LiveId" clId="{F217014B-EAAD-45A9-9A2C-EC76D7AEDF22}" dt="2021-08-14T07:10:40.577" v="137" actId="1076"/>
       <pc:docMkLst>
         <pc:docMk/>
       </pc:docMkLst>
+      <pc:sldChg chg="addSp modSp mod">
+        <pc:chgData name="Gary Whitney" userId="c5a75123e981c5c3" providerId="LiveId" clId="{F217014B-EAAD-45A9-9A2C-EC76D7AEDF22}" dt="2021-08-14T07:08:28.815" v="122" actId="14100"/>
+        <pc:sldMkLst>
+          <pc:docMk/>
+          <pc:sldMk cId="116577400" sldId="258"/>
+        </pc:sldMkLst>
+        <pc:spChg chg="mod">
+          <ac:chgData name="Gary Whitney" userId="c5a75123e981c5c3" providerId="LiveId" clId="{F217014B-EAAD-45A9-9A2C-EC76D7AEDF22}" dt="2021-08-14T07:07:24.392" v="69" actId="1076"/>
+          <ac:spMkLst>
+            <pc:docMk/>
+            <pc:sldMk cId="116577400" sldId="258"/>
+            <ac:spMk id="4" creationId="{74CFB74C-9D88-4874-AC87-F80907B94A0B}"/>
+          </ac:spMkLst>
+        </pc:spChg>
+        <pc:spChg chg="add mod">
+          <ac:chgData name="Gary Whitney" userId="c5a75123e981c5c3" providerId="LiveId" clId="{F217014B-EAAD-45A9-9A2C-EC76D7AEDF22}" dt="2021-08-14T07:08:28.815" v="122" actId="14100"/>
+          <ac:spMkLst>
+            <pc:docMk/>
+            <pc:sldMk cId="116577400" sldId="258"/>
+            <ac:spMk id="7" creationId="{E5F90F70-B081-44B9-BDD1-EEB5F9BE297E}"/>
+          </ac:spMkLst>
+        </pc:spChg>
+        <pc:picChg chg="mod">
+          <ac:chgData name="Gary Whitney" userId="c5a75123e981c5c3" providerId="LiveId" clId="{F217014B-EAAD-45A9-9A2C-EC76D7AEDF22}" dt="2021-08-14T07:07:13.100" v="67" actId="1076"/>
+          <ac:picMkLst>
+            <pc:docMk/>
+            <pc:sldMk cId="116577400" sldId="258"/>
+            <ac:picMk id="5" creationId="{BB488331-B0B7-46B7-BE32-553B91C2BD62}"/>
+          </ac:picMkLst>
+        </pc:picChg>
+        <pc:picChg chg="mod">
+          <ac:chgData name="Gary Whitney" userId="c5a75123e981c5c3" providerId="LiveId" clId="{F217014B-EAAD-45A9-9A2C-EC76D7AEDF22}" dt="2021-08-14T07:07:18.796" v="68" actId="1076"/>
+          <ac:picMkLst>
+            <pc:docMk/>
+            <pc:sldMk cId="116577400" sldId="258"/>
+            <ac:picMk id="6" creationId="{6E96027C-7DF2-4F9B-A33B-74C558CAAE4C}"/>
+          </ac:picMkLst>
+        </pc:picChg>
+      </pc:sldChg>
+      <pc:sldChg chg="addSp modSp mod">
+        <pc:chgData name="Gary Whitney" userId="c5a75123e981c5c3" providerId="LiveId" clId="{F217014B-EAAD-45A9-9A2C-EC76D7AEDF22}" dt="2021-08-14T07:09:31.194" v="130" actId="14100"/>
+        <pc:sldMkLst>
+          <pc:docMk/>
+          <pc:sldMk cId="971223891" sldId="265"/>
+        </pc:sldMkLst>
+        <pc:spChg chg="add mod">
+          <ac:chgData name="Gary Whitney" userId="c5a75123e981c5c3" providerId="LiveId" clId="{F217014B-EAAD-45A9-9A2C-EC76D7AEDF22}" dt="2021-08-14T07:09:31.194" v="130" actId="14100"/>
+          <ac:spMkLst>
+            <pc:docMk/>
+            <pc:sldMk cId="971223891" sldId="265"/>
+            <ac:spMk id="9" creationId="{E53BEED3-A715-4292-AE0F-8240AC09A36A}"/>
+          </ac:spMkLst>
+        </pc:spChg>
+        <pc:picChg chg="mod">
+          <ac:chgData name="Gary Whitney" userId="c5a75123e981c5c3" providerId="LiveId" clId="{F217014B-EAAD-45A9-9A2C-EC76D7AEDF22}" dt="2021-08-14T07:08:53.660" v="123" actId="1076"/>
+          <ac:picMkLst>
+            <pc:docMk/>
+            <pc:sldMk cId="971223891" sldId="265"/>
+            <ac:picMk id="5" creationId="{80BCDA14-BF6C-4CC3-9086-C266F9B6A8F5}"/>
+          </ac:picMkLst>
+        </pc:picChg>
+        <pc:picChg chg="mod">
+          <ac:chgData name="Gary Whitney" userId="c5a75123e981c5c3" providerId="LiveId" clId="{F217014B-EAAD-45A9-9A2C-EC76D7AEDF22}" dt="2021-08-14T07:09:07.307" v="126" actId="1076"/>
+          <ac:picMkLst>
+            <pc:docMk/>
+            <pc:sldMk cId="971223891" sldId="265"/>
+            <ac:picMk id="6" creationId="{1F7CBC53-57B0-4BA8-87AC-21C5026B1BB9}"/>
+          </ac:picMkLst>
+        </pc:picChg>
+        <pc:picChg chg="mod">
+          <ac:chgData name="Gary Whitney" userId="c5a75123e981c5c3" providerId="LiveId" clId="{F217014B-EAAD-45A9-9A2C-EC76D7AEDF22}" dt="2021-08-14T07:09:03.681" v="125" actId="1076"/>
+          <ac:picMkLst>
+            <pc:docMk/>
+            <pc:sldMk cId="971223891" sldId="265"/>
+            <ac:picMk id="8" creationId="{74C81B10-C070-46C2-B186-446B350FAB8F}"/>
+          </ac:picMkLst>
+        </pc:picChg>
+      </pc:sldChg>
+      <pc:sldChg chg="addSp modSp mod">
+        <pc:chgData name="Gary Whitney" userId="c5a75123e981c5c3" providerId="LiveId" clId="{F217014B-EAAD-45A9-9A2C-EC76D7AEDF22}" dt="2021-08-14T07:06:30.817" v="63" actId="1076"/>
+        <pc:sldMkLst>
+          <pc:docMk/>
+          <pc:sldMk cId="1779737204" sldId="276"/>
+        </pc:sldMkLst>
+        <pc:spChg chg="add mod">
+          <ac:chgData name="Gary Whitney" userId="c5a75123e981c5c3" providerId="LiveId" clId="{F217014B-EAAD-45A9-9A2C-EC76D7AEDF22}" dt="2021-08-14T07:06:30.817" v="63" actId="1076"/>
+          <ac:spMkLst>
+            <pc:docMk/>
+            <pc:sldMk cId="1779737204" sldId="276"/>
+            <ac:spMk id="7" creationId="{41574D77-427B-4279-ACF2-FCF4AAF86E48}"/>
+          </ac:spMkLst>
+        </pc:spChg>
+      </pc:sldChg>
+      <pc:sldChg chg="addSp modSp mod">
+        <pc:chgData name="Gary Whitney" userId="c5a75123e981c5c3" providerId="LiveId" clId="{F217014B-EAAD-45A9-9A2C-EC76D7AEDF22}" dt="2021-08-14T07:10:06.942" v="134" actId="14100"/>
+        <pc:sldMkLst>
+          <pc:docMk/>
+          <pc:sldMk cId="2989961921" sldId="277"/>
+        </pc:sldMkLst>
+        <pc:spChg chg="add mod">
+          <ac:chgData name="Gary Whitney" userId="c5a75123e981c5c3" providerId="LiveId" clId="{F217014B-EAAD-45A9-9A2C-EC76D7AEDF22}" dt="2021-08-14T07:10:06.942" v="134" actId="14100"/>
+          <ac:spMkLst>
+            <pc:docMk/>
+            <pc:sldMk cId="2989961921" sldId="277"/>
+            <ac:spMk id="6" creationId="{804816BF-E9E1-40DB-9816-8C6BE8534877}"/>
+          </ac:spMkLst>
+        </pc:spChg>
+        <pc:picChg chg="mod">
+          <ac:chgData name="Gary Whitney" userId="c5a75123e981c5c3" providerId="LiveId" clId="{F217014B-EAAD-45A9-9A2C-EC76D7AEDF22}" dt="2021-08-14T07:09:49.412" v="131" actId="1076"/>
+          <ac:picMkLst>
+            <pc:docMk/>
+            <pc:sldMk cId="2989961921" sldId="277"/>
+            <ac:picMk id="10" creationId="{2CA2147C-3821-4B27-BDF5-1C26F992F391}"/>
+          </ac:picMkLst>
+        </pc:picChg>
+      </pc:sldChg>
       <pc:sldChg chg="addSp delSp modSp mod">
-        <pc:chgData name="Gary Whitney" userId="c5a75123e981c5c3" providerId="LiveId" clId="{F217014B-EAAD-45A9-9A2C-EC76D7AEDF22}" dt="2021-08-14T06:21:51.297" v="43" actId="14100"/>
+        <pc:chgData name="Gary Whitney" userId="c5a75123e981c5c3" providerId="LiveId" clId="{F217014B-EAAD-45A9-9A2C-EC76D7AEDF22}" dt="2021-08-14T07:10:40.577" v="137" actId="1076"/>
         <pc:sldMkLst>
           <pc:docMk/>
           <pc:sldMk cId="227139849" sldId="278"/>
         </pc:sldMkLst>
+        <pc:spChg chg="add mod">
+          <ac:chgData name="Gary Whitney" userId="c5a75123e981c5c3" providerId="LiveId" clId="{F217014B-EAAD-45A9-9A2C-EC76D7AEDF22}" dt="2021-08-14T07:10:40.577" v="137" actId="1076"/>
+          <ac:spMkLst>
+            <pc:docMk/>
+            <pc:sldMk cId="227139849" sldId="278"/>
+            <ac:spMk id="7" creationId="{9510D37C-B929-4B2F-8A9A-631B19174574}"/>
+          </ac:spMkLst>
+        </pc:spChg>
         <pc:picChg chg="del">
           <ac:chgData name="Gary Whitney" userId="c5a75123e981c5c3" providerId="LiveId" clId="{F217014B-EAAD-45A9-9A2C-EC76D7AEDF22}" dt="2021-08-14T06:21:14.721" v="36" actId="478"/>
           <ac:picMkLst>
@@ -151,13 +275,28 @@
           </ac:picMkLst>
         </pc:picChg>
         <pc:picChg chg="add mod">
-          <ac:chgData name="Gary Whitney" userId="c5a75123e981c5c3" providerId="LiveId" clId="{F217014B-EAAD-45A9-9A2C-EC76D7AEDF22}" dt="2021-08-14T06:21:51.297" v="43" actId="14100"/>
+          <ac:chgData name="Gary Whitney" userId="c5a75123e981c5c3" providerId="LiveId" clId="{F217014B-EAAD-45A9-9A2C-EC76D7AEDF22}" dt="2021-08-14T07:10:25.947" v="135" actId="14100"/>
           <ac:picMkLst>
             <pc:docMk/>
             <pc:sldMk cId="227139849" sldId="278"/>
             <ac:picMk id="6" creationId="{1EBBF1F7-0E62-4220-8614-1506EFFAFFDC}"/>
           </ac:picMkLst>
         </pc:picChg>
+      </pc:sldChg>
+      <pc:sldChg chg="addSp modSp mod">
+        <pc:chgData name="Gary Whitney" userId="c5a75123e981c5c3" providerId="LiveId" clId="{F217014B-EAAD-45A9-9A2C-EC76D7AEDF22}" dt="2021-08-14T07:06:55.314" v="66" actId="14100"/>
+        <pc:sldMkLst>
+          <pc:docMk/>
+          <pc:sldMk cId="4079575894" sldId="279"/>
+        </pc:sldMkLst>
+        <pc:spChg chg="add mod">
+          <ac:chgData name="Gary Whitney" userId="c5a75123e981c5c3" providerId="LiveId" clId="{F217014B-EAAD-45A9-9A2C-EC76D7AEDF22}" dt="2021-08-14T07:06:55.314" v="66" actId="14100"/>
+          <ac:spMkLst>
+            <pc:docMk/>
+            <pc:sldMk cId="4079575894" sldId="279"/>
+            <ac:spMk id="9" creationId="{DDAC2A21-59F1-4FC4-B796-432A216F12C2}"/>
+          </ac:spMkLst>
+        </pc:spChg>
       </pc:sldChg>
       <pc:sldChg chg="addSp delSp modSp add mod">
         <pc:chgData name="Gary Whitney" userId="c5a75123e981c5c3" providerId="LiveId" clId="{F217014B-EAAD-45A9-9A2C-EC76D7AEDF22}" dt="2021-08-14T06:25:19.923" v="59" actId="14100"/>
@@ -3751,6 +3890,58 @@
           </a:prstGeom>
         </p:spPr>
       </p:pic>
+      <p:sp>
+        <p:nvSpPr>
+          <p:cNvPr id="7" name="TextBox 6">
+            <a:extLst>
+              <a:ext uri="{FF2B5EF4-FFF2-40B4-BE49-F238E27FC236}">
+                <a16:creationId xmlns:a16="http://schemas.microsoft.com/office/drawing/2014/main" id="{41574D77-427B-4279-ACF2-FCF4AAF86E48}"/>
+              </a:ext>
+            </a:extLst>
+          </p:cNvPr>
+          <p:cNvSpPr txBox="1"/>
+          <p:nvPr/>
+        </p:nvSpPr>
+        <p:spPr>
+          <a:xfrm>
+            <a:off x="412376" y="857151"/>
+            <a:ext cx="3698120" cy="923330"/>
+          </a:xfrm>
+          <a:prstGeom prst="rect">
+            <a:avLst/>
+          </a:prstGeom>
+          <a:noFill/>
+        </p:spPr>
+        <p:txBody>
+          <a:bodyPr wrap="square">
+            <a:spAutoFit/>
+          </a:bodyPr>
+          <a:lstStyle/>
+          <a:p>
+            <a:pPr algn="l">
+              <a:buFont typeface="Arial" panose="020B0604020202020204" pitchFamily="34" charset="0"/>
+              <a:buChar char="•"/>
+            </a:pPr>
+            <a:r>
+              <a:rPr lang="en-US" b="1" i="0" dirty="0">
+                <a:solidFill>
+                  <a:srgbClr val="24292E"/>
+                </a:solidFill>
+                <a:effectLst/>
+                <a:latin typeface="-apple-system"/>
+              </a:rPr>
+              <a:t>Hypothesis 1: Greater volume of traffic increases the number of accidents</a:t>
+            </a:r>
+            <a:endParaRPr lang="en-US" b="0" i="0" dirty="0">
+              <a:solidFill>
+                <a:srgbClr val="24292E"/>
+              </a:solidFill>
+              <a:effectLst/>
+              <a:latin typeface="-apple-system"/>
+            </a:endParaRPr>
+          </a:p>
+        </p:txBody>
+      </p:sp>
     </p:spTree>
     <p:extLst>
       <p:ext uri="{BB962C8B-B14F-4D97-AF65-F5344CB8AC3E}">
@@ -3931,6 +4122,58 @@
           </a:prstGeom>
         </p:spPr>
       </p:pic>
+      <p:sp>
+        <p:nvSpPr>
+          <p:cNvPr id="9" name="TextBox 8">
+            <a:extLst>
+              <a:ext uri="{FF2B5EF4-FFF2-40B4-BE49-F238E27FC236}">
+                <a16:creationId xmlns:a16="http://schemas.microsoft.com/office/drawing/2014/main" id="{DDAC2A21-59F1-4FC4-B796-432A216F12C2}"/>
+              </a:ext>
+            </a:extLst>
+          </p:cNvPr>
+          <p:cNvSpPr txBox="1"/>
+          <p:nvPr/>
+        </p:nvSpPr>
+        <p:spPr>
+          <a:xfrm>
+            <a:off x="412376" y="1077006"/>
+            <a:ext cx="3351756" cy="923330"/>
+          </a:xfrm>
+          <a:prstGeom prst="rect">
+            <a:avLst/>
+          </a:prstGeom>
+          <a:noFill/>
+        </p:spPr>
+        <p:txBody>
+          <a:bodyPr wrap="square">
+            <a:spAutoFit/>
+          </a:bodyPr>
+          <a:lstStyle/>
+          <a:p>
+            <a:pPr algn="l">
+              <a:buFont typeface="Arial" panose="020B0604020202020204" pitchFamily="34" charset="0"/>
+              <a:buChar char="•"/>
+            </a:pPr>
+            <a:r>
+              <a:rPr lang="en-US" b="1" i="0" dirty="0">
+                <a:solidFill>
+                  <a:srgbClr val="24292E"/>
+                </a:solidFill>
+                <a:effectLst/>
+                <a:latin typeface="-apple-system"/>
+              </a:rPr>
+              <a:t>Hypothesis 2: Urban areas have a greater number of accidents than rural areas</a:t>
+            </a:r>
+            <a:endParaRPr lang="en-US" b="0" i="0" dirty="0">
+              <a:solidFill>
+                <a:srgbClr val="24292E"/>
+              </a:solidFill>
+              <a:effectLst/>
+              <a:latin typeface="-apple-system"/>
+            </a:endParaRPr>
+          </a:p>
+        </p:txBody>
+      </p:sp>
     </p:spTree>
     <p:extLst>
       <p:ext uri="{BB962C8B-B14F-4D97-AF65-F5344CB8AC3E}">
@@ -3989,7 +4232,7 @@
         </p:blipFill>
         <p:spPr>
           <a:xfrm>
-            <a:off x="0" y="142613"/>
+            <a:off x="2760955" y="62474"/>
             <a:ext cx="5686268" cy="3371112"/>
           </a:xfrm>
           <a:prstGeom prst="rect">
@@ -4047,7 +4290,7 @@
         </p:nvSpPr>
         <p:spPr>
           <a:xfrm>
-            <a:off x="445932" y="30161"/>
+            <a:off x="44055" y="53596"/>
             <a:ext cx="6096000" cy="369332"/>
           </a:xfrm>
           <a:prstGeom prst="rect">
@@ -4103,7 +4346,7 @@
         </p:blipFill>
         <p:spPr>
           <a:xfrm>
-            <a:off x="6196378" y="11737"/>
+            <a:off x="8087322" y="30161"/>
             <a:ext cx="4036487" cy="3435739"/>
           </a:xfrm>
           <a:prstGeom prst="rect">
@@ -4111,6 +4354,58 @@
           </a:prstGeom>
         </p:spPr>
       </p:pic>
+      <p:sp>
+        <p:nvSpPr>
+          <p:cNvPr id="7" name="TextBox 6">
+            <a:extLst>
+              <a:ext uri="{FF2B5EF4-FFF2-40B4-BE49-F238E27FC236}">
+                <a16:creationId xmlns:a16="http://schemas.microsoft.com/office/drawing/2014/main" id="{E5F90F70-B081-44B9-BDD1-EEB5F9BE297E}"/>
+              </a:ext>
+            </a:extLst>
+          </p:cNvPr>
+          <p:cNvSpPr txBox="1"/>
+          <p:nvPr/>
+        </p:nvSpPr>
+        <p:spPr>
+          <a:xfrm>
+            <a:off x="44055" y="648940"/>
+            <a:ext cx="2974353" cy="1200329"/>
+          </a:xfrm>
+          <a:prstGeom prst="rect">
+            <a:avLst/>
+          </a:prstGeom>
+          <a:noFill/>
+        </p:spPr>
+        <p:txBody>
+          <a:bodyPr wrap="square">
+            <a:spAutoFit/>
+          </a:bodyPr>
+          <a:lstStyle/>
+          <a:p>
+            <a:pPr algn="l">
+              <a:buFont typeface="Arial" panose="020B0604020202020204" pitchFamily="34" charset="0"/>
+              <a:buChar char="•"/>
+            </a:pPr>
+            <a:r>
+              <a:rPr lang="en-US" b="1" i="0" dirty="0">
+                <a:solidFill>
+                  <a:srgbClr val="24292E"/>
+                </a:solidFill>
+                <a:effectLst/>
+                <a:latin typeface="-apple-system"/>
+              </a:rPr>
+              <a:t>Hypothesis 3: The time or day of the week does not affect the number of accidents</a:t>
+            </a:r>
+            <a:endParaRPr lang="en-US" b="0" i="0" dirty="0">
+              <a:solidFill>
+                <a:srgbClr val="24292E"/>
+              </a:solidFill>
+              <a:effectLst/>
+              <a:latin typeface="-apple-system"/>
+            </a:endParaRPr>
+          </a:p>
+        </p:txBody>
+      </p:sp>
     </p:spTree>
     <p:extLst>
       <p:ext uri="{BB962C8B-B14F-4D97-AF65-F5344CB8AC3E}">
@@ -4169,7 +4464,7 @@
         </p:blipFill>
         <p:spPr>
           <a:xfrm>
-            <a:off x="41526" y="790094"/>
+            <a:off x="-32327" y="4304530"/>
             <a:ext cx="6128327" cy="2553470"/>
           </a:xfrm>
           <a:prstGeom prst="rect">
@@ -4205,7 +4500,7 @@
         </p:blipFill>
         <p:spPr>
           <a:xfrm>
-            <a:off x="6063673" y="790094"/>
+            <a:off x="5886120" y="4304530"/>
             <a:ext cx="6128327" cy="2553470"/>
           </a:xfrm>
           <a:prstGeom prst="rect">
@@ -4281,7 +4576,7 @@
         </p:blipFill>
         <p:spPr>
           <a:xfrm>
-            <a:off x="2558472" y="3429001"/>
+            <a:off x="5470348" y="522607"/>
             <a:ext cx="6128327" cy="3192348"/>
           </a:xfrm>
           <a:prstGeom prst="rect">
@@ -4289,6 +4584,58 @@
           </a:prstGeom>
         </p:spPr>
       </p:pic>
+      <p:sp>
+        <p:nvSpPr>
+          <p:cNvPr id="9" name="TextBox 8">
+            <a:extLst>
+              <a:ext uri="{FF2B5EF4-FFF2-40B4-BE49-F238E27FC236}">
+                <a16:creationId xmlns:a16="http://schemas.microsoft.com/office/drawing/2014/main" id="{E53BEED3-A715-4292-AE0F-8240AC09A36A}"/>
+              </a:ext>
+            </a:extLst>
+          </p:cNvPr>
+          <p:cNvSpPr txBox="1"/>
+          <p:nvPr/>
+        </p:nvSpPr>
+        <p:spPr>
+          <a:xfrm>
+            <a:off x="412376" y="1039557"/>
+            <a:ext cx="4496975" cy="646331"/>
+          </a:xfrm>
+          <a:prstGeom prst="rect">
+            <a:avLst/>
+          </a:prstGeom>
+          <a:noFill/>
+        </p:spPr>
+        <p:txBody>
+          <a:bodyPr wrap="square">
+            <a:spAutoFit/>
+          </a:bodyPr>
+          <a:lstStyle/>
+          <a:p>
+            <a:pPr algn="l">
+              <a:buFont typeface="Arial" panose="020B0604020202020204" pitchFamily="34" charset="0"/>
+              <a:buChar char="•"/>
+            </a:pPr>
+            <a:r>
+              <a:rPr lang="en-US" b="1" i="0" dirty="0">
+                <a:solidFill>
+                  <a:srgbClr val="24292E"/>
+                </a:solidFill>
+                <a:effectLst/>
+                <a:latin typeface="-apple-system"/>
+              </a:rPr>
+              <a:t>Hypothesis 4: Speed limits do not influence the number of accidents</a:t>
+            </a:r>
+            <a:endParaRPr lang="en-US" b="0" i="0" dirty="0">
+              <a:solidFill>
+                <a:srgbClr val="24292E"/>
+              </a:solidFill>
+              <a:effectLst/>
+              <a:latin typeface="-apple-system"/>
+            </a:endParaRPr>
+          </a:p>
+        </p:txBody>
+      </p:sp>
     </p:spTree>
     <p:extLst>
       <p:ext uri="{BB962C8B-B14F-4D97-AF65-F5344CB8AC3E}">
@@ -4425,7 +4772,7 @@
         </p:blipFill>
         <p:spPr>
           <a:xfrm>
-            <a:off x="266384" y="1016000"/>
+            <a:off x="266384" y="2880311"/>
             <a:ext cx="5654950" cy="6858000"/>
           </a:xfrm>
           <a:prstGeom prst="rect">
@@ -4433,6 +4780,58 @@
           </a:prstGeom>
         </p:spPr>
       </p:pic>
+      <p:sp>
+        <p:nvSpPr>
+          <p:cNvPr id="6" name="TextBox 5">
+            <a:extLst>
+              <a:ext uri="{FF2B5EF4-FFF2-40B4-BE49-F238E27FC236}">
+                <a16:creationId xmlns:a16="http://schemas.microsoft.com/office/drawing/2014/main" id="{804816BF-E9E1-40DB-9816-8C6BE8534877}"/>
+              </a:ext>
+            </a:extLst>
+          </p:cNvPr>
+          <p:cNvSpPr txBox="1"/>
+          <p:nvPr/>
+        </p:nvSpPr>
+        <p:spPr>
+          <a:xfrm>
+            <a:off x="412376" y="977414"/>
+            <a:ext cx="3555942" cy="923330"/>
+          </a:xfrm>
+          <a:prstGeom prst="rect">
+            <a:avLst/>
+          </a:prstGeom>
+          <a:noFill/>
+        </p:spPr>
+        <p:txBody>
+          <a:bodyPr wrap="square">
+            <a:spAutoFit/>
+          </a:bodyPr>
+          <a:lstStyle/>
+          <a:p>
+            <a:pPr algn="l">
+              <a:buFont typeface="Arial" panose="020B0604020202020204" pitchFamily="34" charset="0"/>
+              <a:buChar char="•"/>
+            </a:pPr>
+            <a:r>
+              <a:rPr lang="en-US" b="1" i="0" dirty="0">
+                <a:solidFill>
+                  <a:srgbClr val="24292E"/>
+                </a:solidFill>
+                <a:effectLst/>
+                <a:latin typeface="-apple-system"/>
+              </a:rPr>
+              <a:t>Hypothesis 5: Biological factors like gender and age do not influence the number of accidents</a:t>
+            </a:r>
+            <a:endParaRPr lang="en-US" b="0" i="0" dirty="0">
+              <a:solidFill>
+                <a:srgbClr val="24292E"/>
+              </a:solidFill>
+              <a:effectLst/>
+              <a:latin typeface="-apple-system"/>
+            </a:endParaRPr>
+          </a:p>
+        </p:txBody>
+      </p:sp>
     </p:spTree>
     <p:extLst>
       <p:ext uri="{BB962C8B-B14F-4D97-AF65-F5344CB8AC3E}">
@@ -4589,14 +4988,86 @@
         </p:blipFill>
         <p:spPr>
           <a:xfrm>
-            <a:off x="113018" y="1072793"/>
-            <a:ext cx="6839940" cy="5574145"/>
+            <a:off x="113018" y="2530136"/>
+            <a:ext cx="6839940" cy="4116802"/>
           </a:xfrm>
           <a:prstGeom prst="rect">
             <a:avLst/>
           </a:prstGeom>
         </p:spPr>
       </p:pic>
+      <p:sp>
+        <p:nvSpPr>
+          <p:cNvPr id="7" name="TextBox 6">
+            <a:extLst>
+              <a:ext uri="{FF2B5EF4-FFF2-40B4-BE49-F238E27FC236}">
+                <a16:creationId xmlns:a16="http://schemas.microsoft.com/office/drawing/2014/main" id="{9510D37C-B929-4B2F-8A9A-631B19174574}"/>
+              </a:ext>
+            </a:extLst>
+          </p:cNvPr>
+          <p:cNvSpPr txBox="1"/>
+          <p:nvPr/>
+        </p:nvSpPr>
+        <p:spPr>
+          <a:xfrm>
+            <a:off x="413856" y="993457"/>
+            <a:ext cx="6094520" cy="646331"/>
+          </a:xfrm>
+          <a:prstGeom prst="rect">
+            <a:avLst/>
+          </a:prstGeom>
+          <a:noFill/>
+        </p:spPr>
+        <p:txBody>
+          <a:bodyPr wrap="square">
+            <a:spAutoFit/>
+          </a:bodyPr>
+          <a:lstStyle/>
+          <a:p>
+            <a:pPr algn="l">
+              <a:buFont typeface="Arial" panose="020B0604020202020204" pitchFamily="34" charset="0"/>
+              <a:buChar char="•"/>
+            </a:pPr>
+            <a:r>
+              <a:rPr lang="en-US" b="1" i="0" dirty="0">
+                <a:solidFill>
+                  <a:srgbClr val="24292E"/>
+                </a:solidFill>
+                <a:effectLst/>
+                <a:latin typeface="-apple-system"/>
+              </a:rPr>
+              <a:t>Hypothesis 6: Location on the road or vehicle </a:t>
+            </a:r>
+            <a:r>
+              <a:rPr lang="en-US" b="1" i="0" dirty="0" err="1">
+                <a:solidFill>
+                  <a:srgbClr val="24292E"/>
+                </a:solidFill>
+                <a:effectLst/>
+                <a:latin typeface="-apple-system"/>
+              </a:rPr>
+              <a:t>manoeuvre</a:t>
+            </a:r>
+            <a:r>
+              <a:rPr lang="en-US" b="1" i="0" dirty="0">
+                <a:solidFill>
+                  <a:srgbClr val="24292E"/>
+                </a:solidFill>
+                <a:effectLst/>
+                <a:latin typeface="-apple-system"/>
+              </a:rPr>
+              <a:t> does not influence the number of accidents</a:t>
+            </a:r>
+            <a:endParaRPr lang="en-US" b="0" i="0" dirty="0">
+              <a:solidFill>
+                <a:srgbClr val="24292E"/>
+              </a:solidFill>
+              <a:effectLst/>
+              <a:latin typeface="-apple-system"/>
+            </a:endParaRPr>
+          </a:p>
+        </p:txBody>
+      </p:sp>
     </p:spTree>
     <p:extLst>
       <p:ext uri="{BB962C8B-B14F-4D97-AF65-F5344CB8AC3E}">

</xml_diff>